<commit_message>
Latter half of slides
</commit_message>
<xml_diff>
--- a/Students/mason-rumuly/tutorial/Thompson Sampling.pptx
+++ b/Students/mason-rumuly/tutorial/Thompson Sampling.pptx
@@ -14,6 +14,7 @@
     <p:sldId id="262" r:id="rId8"/>
     <p:sldId id="263" r:id="rId9"/>
     <p:sldId id="264" r:id="rId10"/>
+    <p:sldId id="265" r:id="rId11"/>
   </p:sldIdLst>
   <p:sldSz cx="12192000" cy="6858000"/>
   <p:notesSz cx="6858000" cy="9144000"/>
@@ -3919,10 +3920,244 @@
           </a:p>
         </p:txBody>
       </p:sp>
+      <p:pic>
+        <p:nvPicPr>
+          <p:cNvPr id="5" name="Picture 4">
+            <a:extLst>
+              <a:ext uri="{FF2B5EF4-FFF2-40B4-BE49-F238E27FC236}">
+                <a16:creationId xmlns:a16="http://schemas.microsoft.com/office/drawing/2014/main" id="{6B82268C-8600-4DED-9CB4-43DA6E4DBC1D}"/>
+              </a:ext>
+            </a:extLst>
+          </p:cNvPr>
+          <p:cNvPicPr>
+            <a:picLocks noChangeAspect="1"/>
+          </p:cNvPicPr>
+          <p:nvPr/>
+        </p:nvPicPr>
+        <p:blipFill>
+          <a:blip r:embed="rId2">
+            <a:extLst>
+              <a:ext uri="{28A0092B-C50C-407E-A947-70E740481C1C}">
+                <a14:useLocalDpi xmlns:a14="http://schemas.microsoft.com/office/drawing/2010/main" val="0"/>
+              </a:ext>
+            </a:extLst>
+          </a:blip>
+          <a:stretch>
+            <a:fillRect/>
+          </a:stretch>
+        </p:blipFill>
+        <p:spPr>
+          <a:xfrm>
+            <a:off x="690037" y="5221297"/>
+            <a:ext cx="4504953" cy="896114"/>
+          </a:xfrm>
+          <a:prstGeom prst="rect">
+            <a:avLst/>
+          </a:prstGeom>
+        </p:spPr>
+      </p:pic>
     </p:spTree>
     <p:extLst>
       <p:ext uri="{BB962C8B-B14F-4D97-AF65-F5344CB8AC3E}">
         <p14:creationId xmlns:p14="http://schemas.microsoft.com/office/powerpoint/2010/main" val="4203257177"/>
+      </p:ext>
+    </p:extLst>
+  </p:cSld>
+  <p:clrMapOvr>
+    <a:masterClrMapping/>
+  </p:clrMapOvr>
+</p:sld>
+</file>
+
+<file path=ppt/slides/slide10.xml><?xml version="1.0" encoding="utf-8"?>
+<p:sld xmlns:a="http://schemas.openxmlformats.org/drawingml/2006/main" xmlns:r="http://schemas.openxmlformats.org/officeDocument/2006/relationships" xmlns:p="http://schemas.openxmlformats.org/presentationml/2006/main">
+  <p:cSld>
+    <p:spTree>
+      <p:nvGrpSpPr>
+        <p:cNvPr id="1" name=""/>
+        <p:cNvGrpSpPr/>
+        <p:nvPr/>
+      </p:nvGrpSpPr>
+      <p:grpSpPr>
+        <a:xfrm>
+          <a:off x="0" y="0"/>
+          <a:ext cx="0" cy="0"/>
+          <a:chOff x="0" y="0"/>
+          <a:chExt cx="0" cy="0"/>
+        </a:xfrm>
+      </p:grpSpPr>
+      <p:sp>
+        <p:nvSpPr>
+          <p:cNvPr id="2" name="Title 1">
+            <a:extLst>
+              <a:ext uri="{FF2B5EF4-FFF2-40B4-BE49-F238E27FC236}">
+                <a16:creationId xmlns:a16="http://schemas.microsoft.com/office/drawing/2014/main" id="{EAAD7DC5-48EF-4CE5-8BF4-A8E169E1F4B4}"/>
+              </a:ext>
+            </a:extLst>
+          </p:cNvPr>
+          <p:cNvSpPr>
+            <a:spLocks noGrp="1"/>
+          </p:cNvSpPr>
+          <p:nvPr>
+            <p:ph type="title"/>
+          </p:nvPr>
+        </p:nvSpPr>
+        <p:spPr/>
+        <p:txBody>
+          <a:bodyPr/>
+          <a:lstStyle/>
+          <a:p>
+            <a:r>
+              <a:rPr lang="en-US" dirty="0"/>
+              <a:t>References</a:t>
+            </a:r>
+          </a:p>
+        </p:txBody>
+      </p:sp>
+      <p:sp>
+        <p:nvSpPr>
+          <p:cNvPr id="3" name="Content Placeholder 2">
+            <a:extLst>
+              <a:ext uri="{FF2B5EF4-FFF2-40B4-BE49-F238E27FC236}">
+                <a16:creationId xmlns:a16="http://schemas.microsoft.com/office/drawing/2014/main" id="{7788E499-76E4-43FB-A608-CCB86248A765}"/>
+              </a:ext>
+            </a:extLst>
+          </p:cNvPr>
+          <p:cNvSpPr>
+            <a:spLocks noGrp="1"/>
+          </p:cNvSpPr>
+          <p:nvPr>
+            <p:ph idx="1"/>
+          </p:nvPr>
+        </p:nvSpPr>
+        <p:spPr/>
+        <p:txBody>
+          <a:bodyPr>
+            <a:normAutofit lnSpcReduction="10000"/>
+          </a:bodyPr>
+          <a:lstStyle/>
+          <a:p>
+            <a:pPr marL="395288" indent="-395288">
+              <a:buNone/>
+            </a:pPr>
+            <a:r>
+              <a:rPr lang="en-US" dirty="0"/>
+              <a:t>[1] Thompson, William R. "On the likelihood that one unknown probability exceeds another in view of the evidence of two samples". </a:t>
+            </a:r>
+            <a:r>
+              <a:rPr lang="en-US" i="1" dirty="0" err="1"/>
+              <a:t>Biometrika</a:t>
+            </a:r>
+            <a:r>
+              <a:rPr lang="en-US" dirty="0"/>
+              <a:t>, 25(3–4):285–294, 1933.</a:t>
+            </a:r>
+          </a:p>
+          <a:p>
+            <a:pPr marL="395288" indent="-395288">
+              <a:buNone/>
+            </a:pPr>
+            <a:r>
+              <a:rPr lang="en-US" dirty="0"/>
+              <a:t>[2] Kaufmann, E., </a:t>
+            </a:r>
+            <a:r>
+              <a:rPr lang="en-US" dirty="0" err="1"/>
+              <a:t>Korda</a:t>
+            </a:r>
+            <a:r>
+              <a:rPr lang="en-US" dirty="0"/>
+              <a:t>, N., &amp; </a:t>
+            </a:r>
+            <a:r>
+              <a:rPr lang="en-US" dirty="0" err="1"/>
+              <a:t>Munos</a:t>
+            </a:r>
+            <a:r>
+              <a:rPr lang="en-US" dirty="0"/>
+              <a:t>, R. “Thompson Sampling: an Asymptotically Optimal Finite-Time Analysis”. </a:t>
+            </a:r>
+            <a:r>
+              <a:rPr lang="en-US" i="1" dirty="0"/>
+              <a:t>Proceedings of the 23</a:t>
+            </a:r>
+            <a:r>
+              <a:rPr lang="en-US" i="1" baseline="30000" dirty="0"/>
+              <a:t>rd</a:t>
+            </a:r>
+            <a:r>
+              <a:rPr lang="en-US" i="1" dirty="0"/>
+              <a:t> international conference on Algorithmic Learning Theory (ALT’12)</a:t>
+            </a:r>
+            <a:r>
+              <a:rPr lang="en-US" dirty="0"/>
+              <a:t> , pp. 199-213. 2012.</a:t>
+            </a:r>
+          </a:p>
+          <a:p>
+            <a:pPr marL="395288" indent="-395288">
+              <a:buNone/>
+            </a:pPr>
+            <a:r>
+              <a:rPr lang="en-US" dirty="0"/>
+              <a:t>[3] Lai, T.L., &amp; Robbins, H. “Asymptotically Efficient Adaptive Allocation Rules”. </a:t>
+            </a:r>
+            <a:r>
+              <a:rPr lang="en-US" i="1" dirty="0"/>
+              <a:t>Advances in applied Mathematics</a:t>
+            </a:r>
+            <a:r>
+              <a:rPr lang="en-US" dirty="0"/>
+              <a:t>, </a:t>
+            </a:r>
+            <a:r>
+              <a:rPr lang="en-US" i="1" dirty="0"/>
+              <a:t>6</a:t>
+            </a:r>
+            <a:r>
+              <a:rPr lang="en-US" dirty="0"/>
+              <a:t>, pp 4-22, 1985.</a:t>
+            </a:r>
+          </a:p>
+          <a:p>
+            <a:pPr marL="341313" indent="-341313">
+              <a:buNone/>
+            </a:pPr>
+            <a:r>
+              <a:rPr lang="en-US" dirty="0"/>
+              <a:t>[4] </a:t>
+            </a:r>
+            <a:r>
+              <a:rPr lang="en-US" dirty="0" err="1"/>
+              <a:t>Junya</a:t>
+            </a:r>
+            <a:r>
+              <a:rPr lang="en-US" dirty="0"/>
+              <a:t> Honda, </a:t>
+            </a:r>
+            <a:r>
+              <a:rPr lang="en-US" dirty="0" err="1"/>
+              <a:t>Akimichi</a:t>
+            </a:r>
+            <a:r>
+              <a:rPr lang="en-US" dirty="0"/>
+              <a:t> </a:t>
+            </a:r>
+            <a:r>
+              <a:rPr lang="en-US" dirty="0" err="1"/>
+              <a:t>Takemura</a:t>
+            </a:r>
+            <a:r>
+              <a:rPr lang="en-US" dirty="0"/>
+              <a:t>.“Optimality of Thompson Sampling for Gaussian Bandits Depends on Priors”. Proceedings of the Seventeenth International Conference on Artificial Intelligence and Statistics, PMLR 33:375-383, 2014.</a:t>
+            </a:r>
+          </a:p>
+        </p:txBody>
+      </p:sp>
+    </p:spTree>
+    <p:extLst>
+      <p:ext uri="{BB962C8B-B14F-4D97-AF65-F5344CB8AC3E}">
+        <p14:creationId xmlns:p14="http://schemas.microsoft.com/office/powerpoint/2010/main" val="3484035188"/>
       </p:ext>
     </p:extLst>
   </p:cSld>
@@ -4037,10 +4272,9 @@
           </a:p>
           <a:p>
             <a:r>
-              <a:rPr lang="en-US"/>
+              <a:rPr lang="en-US" dirty="0"/>
               <a:t>Performance Guarantees </a:t>
             </a:r>
-            <a:endParaRPr lang="en-US" dirty="0"/>
           </a:p>
           <a:p>
             <a:r>
@@ -4158,6 +4392,12 @@
               <a:t>Mention some applications</a:t>
             </a:r>
           </a:p>
+          <a:p>
+            <a:r>
+              <a:rPr lang="en-US" dirty="0"/>
+              <a:t>Stationary distribution, 0-1 outcome. There are extensions to others, but are not necessary to understand fundamentals</a:t>
+            </a:r>
+          </a:p>
         </p:txBody>
       </p:sp>
     </p:spTree>
@@ -4243,7 +4483,7 @@
           <a:bodyPr/>
           <a:lstStyle/>
           <a:p>
-            <a:endParaRPr lang="en-US"/>
+            <a:endParaRPr lang="en-US" dirty="0"/>
           </a:p>
         </p:txBody>
       </p:sp>
@@ -4392,37 +4632,744 @@
           </a:p>
         </p:txBody>
       </p:sp>
-      <p:sp>
-        <p:nvSpPr>
-          <p:cNvPr id="3" name="Content Placeholder 2">
+      <mc:AlternateContent xmlns:mc="http://schemas.openxmlformats.org/markup-compatibility/2006">
+        <mc:Choice xmlns:a14="http://schemas.microsoft.com/office/drawing/2010/main" Requires="a14">
+          <p:sp>
+            <p:nvSpPr>
+              <p:cNvPr id="3" name="Content Placeholder 2">
+                <a:extLst>
+                  <a:ext uri="{FF2B5EF4-FFF2-40B4-BE49-F238E27FC236}">
+                    <a16:creationId xmlns:a16="http://schemas.microsoft.com/office/drawing/2014/main" id="{A4218AC6-0F18-4B2C-9BF3-7D95572A5499}"/>
+                  </a:ext>
+                </a:extLst>
+              </p:cNvPr>
+              <p:cNvSpPr>
+                <a:spLocks noGrp="1"/>
+              </p:cNvSpPr>
+              <p:nvPr>
+                <p:ph idx="1"/>
+              </p:nvPr>
+            </p:nvSpPr>
+            <p:spPr/>
+            <p:txBody>
+              <a:bodyPr>
+                <a:normAutofit/>
+              </a:bodyPr>
+              <a:lstStyle/>
+              <a:p>
+                <a:r>
+                  <a:rPr lang="en-US" dirty="0"/>
+                  <a:t>Proposed in 1933, ignored for most of the 20</a:t>
+                </a:r>
+                <a:r>
+                  <a:rPr lang="en-US" baseline="30000" dirty="0"/>
+                  <a:t>th</a:t>
+                </a:r>
+                <a:r>
+                  <a:rPr lang="en-US" dirty="0"/>
+                  <a:t> century [1]</a:t>
+                </a:r>
+              </a:p>
+              <a:p>
+                <a:r>
+                  <a:rPr lang="en-US" dirty="0"/>
+                  <a:t>Given a multi-arm bandit problem where the set of arms is </a:t>
+                </a:r>
+                <a14:m>
+                  <m:oMath xmlns:m="http://schemas.openxmlformats.org/officeDocument/2006/math">
+                    <m:r>
+                      <a:rPr lang="en-US" b="0" i="1" smtClean="0">
+                        <a:latin typeface="Cambria Math" panose="02040503050406030204" pitchFamily="18" charset="0"/>
+                      </a:rPr>
+                      <m:t>𝒜</m:t>
+                    </m:r>
+                  </m:oMath>
+                </a14:m>
+                <a:endParaRPr lang="en-US" dirty="0"/>
+              </a:p>
+              <a:p>
+                <a:r>
+                  <a:rPr lang="en-US" dirty="0"/>
+                  <a:t>Choose prior value </a:t>
+                </a:r>
+                <a14:m>
+                  <m:oMath xmlns:m="http://schemas.openxmlformats.org/officeDocument/2006/math">
+                    <m:r>
+                      <a:rPr lang="en-US" b="0" i="1" smtClean="0">
+                        <a:latin typeface="Cambria Math" panose="02040503050406030204" pitchFamily="18" charset="0"/>
+                      </a:rPr>
+                      <m:t>𝑝</m:t>
+                    </m:r>
+                  </m:oMath>
+                </a14:m>
+                <a:r>
+                  <a:rPr lang="en-US" dirty="0"/>
+                  <a:t> for Beta distributions; </a:t>
+                </a:r>
+                <a14:m>
+                  <m:oMath xmlns:m="http://schemas.openxmlformats.org/officeDocument/2006/math">
+                    <m:r>
+                      <a:rPr lang="en-US" i="1">
+                        <a:latin typeface="Cambria Math" panose="02040503050406030204" pitchFamily="18" charset="0"/>
+                      </a:rPr>
+                      <m:t>𝑝</m:t>
+                    </m:r>
+                    <m:r>
+                      <a:rPr lang="en-US" i="1">
+                        <a:latin typeface="Cambria Math" panose="02040503050406030204" pitchFamily="18" charset="0"/>
+                      </a:rPr>
+                      <m:t>=1</m:t>
+                    </m:r>
+                  </m:oMath>
+                </a14:m>
+                <a:r>
+                  <a:rPr lang="en-US" dirty="0"/>
+                  <a:t> in the upcoming demonstration.</a:t>
+                </a:r>
+              </a:p>
+              <a:p>
+                <a:r>
+                  <a:rPr lang="en-US" dirty="0"/>
+                  <a:t>Maintain a count of successes (</a:t>
+                </a:r>
+                <a14:m>
+                  <m:oMath xmlns:m="http://schemas.openxmlformats.org/officeDocument/2006/math">
+                    <m:sSub>
+                      <m:sSubPr>
+                        <m:ctrlPr>
+                          <a:rPr lang="en-US" b="0" i="1" smtClean="0">
+                            <a:latin typeface="Cambria Math" panose="02040503050406030204" pitchFamily="18" charset="0"/>
+                          </a:rPr>
+                        </m:ctrlPr>
+                      </m:sSubPr>
+                      <m:e>
+                        <m:r>
+                          <a:rPr lang="en-US" b="0" i="1" smtClean="0">
+                            <a:latin typeface="Cambria Math" panose="02040503050406030204" pitchFamily="18" charset="0"/>
+                          </a:rPr>
+                          <m:t>𝑠</m:t>
+                        </m:r>
+                      </m:e>
+                      <m:sub>
+                        <m:r>
+                          <a:rPr lang="en-US" b="0" i="1" smtClean="0">
+                            <a:latin typeface="Cambria Math" panose="02040503050406030204" pitchFamily="18" charset="0"/>
+                          </a:rPr>
+                          <m:t>𝑎</m:t>
+                        </m:r>
+                      </m:sub>
+                    </m:sSub>
+                  </m:oMath>
+                </a14:m>
+                <a:r>
+                  <a:rPr lang="en-US" dirty="0"/>
+                  <a:t>) and failures (</a:t>
+                </a:r>
+                <a14:m>
+                  <m:oMath xmlns:m="http://schemas.openxmlformats.org/officeDocument/2006/math">
+                    <m:sSub>
+                      <m:sSubPr>
+                        <m:ctrlPr>
+                          <a:rPr lang="en-US" b="0" i="1" smtClean="0">
+                            <a:latin typeface="Cambria Math" panose="02040503050406030204" pitchFamily="18" charset="0"/>
+                          </a:rPr>
+                        </m:ctrlPr>
+                      </m:sSubPr>
+                      <m:e>
+                        <m:r>
+                          <a:rPr lang="en-US" b="0" i="1" smtClean="0">
+                            <a:latin typeface="Cambria Math" panose="02040503050406030204" pitchFamily="18" charset="0"/>
+                          </a:rPr>
+                          <m:t>𝑓</m:t>
+                        </m:r>
+                      </m:e>
+                      <m:sub>
+                        <m:r>
+                          <a:rPr lang="en-US" b="0" i="1" smtClean="0">
+                            <a:latin typeface="Cambria Math" panose="02040503050406030204" pitchFamily="18" charset="0"/>
+                          </a:rPr>
+                          <m:t>𝑎</m:t>
+                        </m:r>
+                      </m:sub>
+                    </m:sSub>
+                  </m:oMath>
+                </a14:m>
+                <a:r>
+                  <a:rPr lang="en-US" dirty="0"/>
+                  <a:t>) observed </a:t>
+                </a:r>
+                <a14:m>
+                  <m:oMath xmlns:m="http://schemas.openxmlformats.org/officeDocument/2006/math">
+                    <m:r>
+                      <a:rPr lang="en-US" b="0" i="1" smtClean="0">
+                        <a:latin typeface="Cambria Math" panose="02040503050406030204" pitchFamily="18" charset="0"/>
+                      </a:rPr>
+                      <m:t>∀</m:t>
+                    </m:r>
+                    <m:r>
+                      <a:rPr lang="en-US" b="0" i="1" smtClean="0">
+                        <a:latin typeface="Cambria Math" panose="02040503050406030204" pitchFamily="18" charset="0"/>
+                      </a:rPr>
+                      <m:t>𝑎</m:t>
+                    </m:r>
+                    <m:r>
+                      <a:rPr lang="en-US" b="0" i="1" smtClean="0">
+                        <a:latin typeface="Cambria Math" panose="02040503050406030204" pitchFamily="18" charset="0"/>
+                      </a:rPr>
+                      <m:t>∈</m:t>
+                    </m:r>
+                    <m:r>
+                      <a:rPr lang="en-US" b="0" i="1" smtClean="0">
+                        <a:latin typeface="Cambria Math" panose="02040503050406030204" pitchFamily="18" charset="0"/>
+                      </a:rPr>
+                      <m:t>𝒜</m:t>
+                    </m:r>
+                  </m:oMath>
+                </a14:m>
+                <a:endParaRPr lang="en-US" dirty="0"/>
+              </a:p>
+              <a:p>
+                <a:r>
+                  <a:rPr lang="en-US" dirty="0"/>
+                  <a:t>For each round:</a:t>
+                </a:r>
+              </a:p>
+              <a:p>
+                <a:pPr lvl="1"/>
+                <a:r>
+                  <a:rPr lang="en-US" dirty="0"/>
+                  <a:t>Sample the Beta distribution </a:t>
+                </a:r>
+                <a14:m>
+                  <m:oMath xmlns:m="http://schemas.openxmlformats.org/officeDocument/2006/math">
+                    <m:sSub>
+                      <m:sSubPr>
+                        <m:ctrlPr>
+                          <a:rPr lang="en-US" b="0" i="1" smtClean="0">
+                            <a:latin typeface="Cambria Math" panose="02040503050406030204" pitchFamily="18" charset="0"/>
+                          </a:rPr>
+                        </m:ctrlPr>
+                      </m:sSubPr>
+                      <m:e>
+                        <m:r>
+                          <a:rPr lang="en-US" b="0" i="1" smtClean="0">
+                            <a:latin typeface="Cambria Math" panose="02040503050406030204" pitchFamily="18" charset="0"/>
+                          </a:rPr>
+                          <m:t>𝑉</m:t>
+                        </m:r>
+                      </m:e>
+                      <m:sub>
+                        <m:r>
+                          <a:rPr lang="en-US" b="0" i="1" smtClean="0">
+                            <a:latin typeface="Cambria Math" panose="02040503050406030204" pitchFamily="18" charset="0"/>
+                          </a:rPr>
+                          <m:t>𝑎</m:t>
+                        </m:r>
+                      </m:sub>
+                    </m:sSub>
+                    <m:r>
+                      <a:rPr lang="en-US" b="0" i="1" smtClean="0">
+                        <a:latin typeface="Cambria Math" panose="02040503050406030204" pitchFamily="18" charset="0"/>
+                      </a:rPr>
+                      <m:t>~</m:t>
+                    </m:r>
+                    <m:r>
+                      <m:rPr>
+                        <m:sty m:val="p"/>
+                      </m:rPr>
+                      <a:rPr lang="en-US" i="0">
+                        <a:latin typeface="Cambria Math" panose="02040503050406030204" pitchFamily="18" charset="0"/>
+                      </a:rPr>
+                      <m:t>Β</m:t>
+                    </m:r>
+                    <m:d>
+                      <m:dPr>
+                        <m:ctrlPr>
+                          <a:rPr lang="en-US">
+                            <a:latin typeface="Cambria Math" panose="02040503050406030204" pitchFamily="18" charset="0"/>
+                          </a:rPr>
+                        </m:ctrlPr>
+                      </m:dPr>
+                      <m:e>
+                        <m:sSub>
+                          <m:sSubPr>
+                            <m:ctrlPr>
+                              <a:rPr lang="en-US" b="0" i="1" smtClean="0">
+                                <a:latin typeface="Cambria Math" panose="02040503050406030204" pitchFamily="18" charset="0"/>
+                              </a:rPr>
+                            </m:ctrlPr>
+                          </m:sSubPr>
+                          <m:e>
+                            <m:r>
+                              <a:rPr lang="en-US" b="0" i="1" smtClean="0">
+                                <a:latin typeface="Cambria Math" panose="02040503050406030204" pitchFamily="18" charset="0"/>
+                              </a:rPr>
+                              <m:t>𝑠</m:t>
+                            </m:r>
+                          </m:e>
+                          <m:sub>
+                            <m:r>
+                              <a:rPr lang="en-US" b="0" i="1" smtClean="0">
+                                <a:latin typeface="Cambria Math" panose="02040503050406030204" pitchFamily="18" charset="0"/>
+                              </a:rPr>
+                              <m:t>𝑎</m:t>
+                            </m:r>
+                          </m:sub>
+                        </m:sSub>
+                        <m:r>
+                          <a:rPr lang="en-US">
+                            <a:latin typeface="Cambria Math" panose="02040503050406030204" pitchFamily="18" charset="0"/>
+                          </a:rPr>
+                          <m:t>+</m:t>
+                        </m:r>
+                        <m:r>
+                          <a:rPr lang="en-US">
+                            <a:latin typeface="Cambria Math" panose="02040503050406030204" pitchFamily="18" charset="0"/>
+                          </a:rPr>
+                          <m:t>𝑝</m:t>
+                        </m:r>
+                        <m:r>
+                          <a:rPr lang="en-US">
+                            <a:latin typeface="Cambria Math" panose="02040503050406030204" pitchFamily="18" charset="0"/>
+                          </a:rPr>
+                          <m:t>,</m:t>
+                        </m:r>
+                        <m:sSub>
+                          <m:sSubPr>
+                            <m:ctrlPr>
+                              <a:rPr lang="en-US" b="0" i="1" smtClean="0">
+                                <a:latin typeface="Cambria Math" panose="02040503050406030204" pitchFamily="18" charset="0"/>
+                              </a:rPr>
+                            </m:ctrlPr>
+                          </m:sSubPr>
+                          <m:e>
+                            <m:r>
+                              <a:rPr lang="en-US" b="0" i="1" smtClean="0">
+                                <a:latin typeface="Cambria Math" panose="02040503050406030204" pitchFamily="18" charset="0"/>
+                              </a:rPr>
+                              <m:t>𝑓</m:t>
+                            </m:r>
+                          </m:e>
+                          <m:sub>
+                            <m:r>
+                              <a:rPr lang="en-US" b="0" i="1" smtClean="0">
+                                <a:latin typeface="Cambria Math" panose="02040503050406030204" pitchFamily="18" charset="0"/>
+                              </a:rPr>
+                              <m:t>𝑎</m:t>
+                            </m:r>
+                          </m:sub>
+                        </m:sSub>
+                        <m:r>
+                          <a:rPr lang="en-US">
+                            <a:latin typeface="Cambria Math" panose="02040503050406030204" pitchFamily="18" charset="0"/>
+                          </a:rPr>
+                          <m:t>+</m:t>
+                        </m:r>
+                        <m:r>
+                          <a:rPr lang="en-US">
+                            <a:latin typeface="Cambria Math" panose="02040503050406030204" pitchFamily="18" charset="0"/>
+                          </a:rPr>
+                          <m:t>𝑝</m:t>
+                        </m:r>
+                      </m:e>
+                    </m:d>
+                  </m:oMath>
+                </a14:m>
+                <a:r>
+                  <a:rPr lang="en-US" dirty="0"/>
+                  <a:t> for each arm, producing </a:t>
+                </a:r>
+                <a14:m>
+                  <m:oMath xmlns:m="http://schemas.openxmlformats.org/officeDocument/2006/math">
+                    <m:sSub>
+                      <m:sSubPr>
+                        <m:ctrlPr>
+                          <a:rPr lang="en-US" b="0" i="1" smtClean="0">
+                            <a:latin typeface="Cambria Math" panose="02040503050406030204" pitchFamily="18" charset="0"/>
+                          </a:rPr>
+                        </m:ctrlPr>
+                      </m:sSubPr>
+                      <m:e>
+                        <m:r>
+                          <a:rPr lang="en-US" b="0" i="1" smtClean="0">
+                            <a:latin typeface="Cambria Math" panose="02040503050406030204" pitchFamily="18" charset="0"/>
+                          </a:rPr>
+                          <m:t>𝑣</m:t>
+                        </m:r>
+                      </m:e>
+                      <m:sub>
+                        <m:r>
+                          <a:rPr lang="en-US" b="0" i="1" smtClean="0">
+                            <a:latin typeface="Cambria Math" panose="02040503050406030204" pitchFamily="18" charset="0"/>
+                          </a:rPr>
+                          <m:t>𝑎</m:t>
+                        </m:r>
+                      </m:sub>
+                    </m:sSub>
+                  </m:oMath>
+                </a14:m>
+                <a:endParaRPr lang="en-US" dirty="0"/>
+              </a:p>
+              <a:p>
+                <a:pPr lvl="1"/>
+                <a:r>
+                  <a:rPr lang="en-US" dirty="0"/>
+                  <a:t>Pull arm associated with greatest sampled value, </a:t>
+                </a:r>
+                <a14:m>
+                  <m:oMath xmlns:m="http://schemas.openxmlformats.org/officeDocument/2006/math">
+                    <m:sSup>
+                      <m:sSupPr>
+                        <m:ctrlPr>
+                          <a:rPr lang="en-US" b="0" i="1" smtClean="0">
+                            <a:latin typeface="Cambria Math" panose="02040503050406030204" pitchFamily="18" charset="0"/>
+                          </a:rPr>
+                        </m:ctrlPr>
+                      </m:sSupPr>
+                      <m:e>
+                        <m:r>
+                          <a:rPr lang="en-US" b="0" i="1" smtClean="0">
+                            <a:latin typeface="Cambria Math" panose="02040503050406030204" pitchFamily="18" charset="0"/>
+                          </a:rPr>
+                          <m:t>𝑎</m:t>
+                        </m:r>
+                      </m:e>
+                      <m:sup>
+                        <m:r>
+                          <a:rPr lang="en-US" b="0" i="1" smtClean="0">
+                            <a:latin typeface="Cambria Math" panose="02040503050406030204" pitchFamily="18" charset="0"/>
+                          </a:rPr>
+                          <m:t>′</m:t>
+                        </m:r>
+                      </m:sup>
+                    </m:sSup>
+                    <m:r>
+                      <a:rPr lang="en-US" b="0" i="1" smtClean="0">
+                        <a:latin typeface="Cambria Math" panose="02040503050406030204" pitchFamily="18" charset="0"/>
+                      </a:rPr>
+                      <m:t>=</m:t>
+                    </m:r>
+                    <m:func>
+                      <m:funcPr>
+                        <m:ctrlPr>
+                          <a:rPr lang="en-US" b="0" i="1" smtClean="0">
+                            <a:latin typeface="Cambria Math" panose="02040503050406030204" pitchFamily="18" charset="0"/>
+                          </a:rPr>
+                        </m:ctrlPr>
+                      </m:funcPr>
+                      <m:fName>
+                        <m:r>
+                          <m:rPr>
+                            <m:sty m:val="p"/>
+                          </m:rPr>
+                          <a:rPr lang="en-US" b="0" i="0" smtClean="0">
+                            <a:latin typeface="Cambria Math" panose="02040503050406030204" pitchFamily="18" charset="0"/>
+                          </a:rPr>
+                          <m:t>arg</m:t>
+                        </m:r>
+                      </m:fName>
+                      <m:e>
+                        <m:func>
+                          <m:funcPr>
+                            <m:ctrlPr>
+                              <a:rPr lang="en-US" b="0" i="1" smtClean="0">
+                                <a:latin typeface="Cambria Math" panose="02040503050406030204" pitchFamily="18" charset="0"/>
+                              </a:rPr>
+                            </m:ctrlPr>
+                          </m:funcPr>
+                          <m:fName>
+                            <m:limLow>
+                              <m:limLowPr>
+                                <m:ctrlPr>
+                                  <a:rPr lang="en-US" b="0" i="1" smtClean="0">
+                                    <a:latin typeface="Cambria Math" panose="02040503050406030204" pitchFamily="18" charset="0"/>
+                                  </a:rPr>
+                                </m:ctrlPr>
+                              </m:limLowPr>
+                              <m:e>
+                                <m:r>
+                                  <m:rPr>
+                                    <m:sty m:val="p"/>
+                                  </m:rPr>
+                                  <a:rPr lang="en-US" b="0" i="0" smtClean="0">
+                                    <a:latin typeface="Cambria Math" panose="02040503050406030204" pitchFamily="18" charset="0"/>
+                                  </a:rPr>
+                                  <m:t>max</m:t>
+                                </m:r>
+                              </m:e>
+                              <m:lim>
+                                <m:r>
+                                  <m:rPr>
+                                    <m:sty m:val="p"/>
+                                  </m:rPr>
+                                  <a:rPr lang="en-US" b="0" i="1" smtClean="0">
+                                    <a:latin typeface="Cambria Math" panose="02040503050406030204" pitchFamily="18" charset="0"/>
+                                  </a:rPr>
+                                  <m:t>a</m:t>
+                                </m:r>
+                                <m:r>
+                                  <a:rPr lang="en-US" b="0" i="1" smtClean="0">
+                                    <a:latin typeface="Cambria Math" panose="02040503050406030204" pitchFamily="18" charset="0"/>
+                                  </a:rPr>
+                                  <m:t>∈</m:t>
+                                </m:r>
+                                <m:r>
+                                  <a:rPr lang="en-US" b="0" i="1" smtClean="0">
+                                    <a:latin typeface="Cambria Math" panose="02040503050406030204" pitchFamily="18" charset="0"/>
+                                  </a:rPr>
+                                  <m:t>𝒜</m:t>
+                                </m:r>
+                              </m:lim>
+                            </m:limLow>
+                          </m:fName>
+                          <m:e>
+                            <m:sSub>
+                              <m:sSubPr>
+                                <m:ctrlPr>
+                                  <a:rPr lang="en-US" b="0" i="1" smtClean="0">
+                                    <a:latin typeface="Cambria Math" panose="02040503050406030204" pitchFamily="18" charset="0"/>
+                                  </a:rPr>
+                                </m:ctrlPr>
+                              </m:sSubPr>
+                              <m:e>
+                                <m:r>
+                                  <a:rPr lang="en-US" b="0" i="1" smtClean="0">
+                                    <a:latin typeface="Cambria Math" panose="02040503050406030204" pitchFamily="18" charset="0"/>
+                                  </a:rPr>
+                                  <m:t>𝑣</m:t>
+                                </m:r>
+                              </m:e>
+                              <m:sub>
+                                <m:r>
+                                  <a:rPr lang="en-US" b="0" i="1" smtClean="0">
+                                    <a:latin typeface="Cambria Math" panose="02040503050406030204" pitchFamily="18" charset="0"/>
+                                  </a:rPr>
+                                  <m:t>𝑎</m:t>
+                                </m:r>
+                              </m:sub>
+                            </m:sSub>
+                          </m:e>
+                        </m:func>
+                      </m:e>
+                    </m:func>
+                  </m:oMath>
+                </a14:m>
+                <a:endParaRPr lang="en-US" dirty="0"/>
+              </a:p>
+              <a:p>
+                <a:pPr lvl="1"/>
+                <a:r>
+                  <a:rPr lang="en-US" dirty="0"/>
+                  <a:t>Record the outcome by incrementing </a:t>
+                </a:r>
+                <a14:m>
+                  <m:oMath xmlns:m="http://schemas.openxmlformats.org/officeDocument/2006/math">
+                    <m:sSub>
+                      <m:sSubPr>
+                        <m:ctrlPr>
+                          <a:rPr lang="en-US" b="0" i="1" smtClean="0">
+                            <a:latin typeface="Cambria Math" panose="02040503050406030204" pitchFamily="18" charset="0"/>
+                          </a:rPr>
+                        </m:ctrlPr>
+                      </m:sSubPr>
+                      <m:e>
+                        <m:r>
+                          <a:rPr lang="en-US" b="0" i="1" smtClean="0">
+                            <a:latin typeface="Cambria Math" panose="02040503050406030204" pitchFamily="18" charset="0"/>
+                          </a:rPr>
+                          <m:t>𝑠</m:t>
+                        </m:r>
+                      </m:e>
+                      <m:sub>
+                        <m:sSup>
+                          <m:sSupPr>
+                            <m:ctrlPr>
+                              <a:rPr lang="en-US" b="0" i="1" smtClean="0">
+                                <a:latin typeface="Cambria Math" panose="02040503050406030204" pitchFamily="18" charset="0"/>
+                              </a:rPr>
+                            </m:ctrlPr>
+                          </m:sSupPr>
+                          <m:e>
+                            <m:r>
+                              <a:rPr lang="en-US" b="0" i="1" smtClean="0">
+                                <a:latin typeface="Cambria Math" panose="02040503050406030204" pitchFamily="18" charset="0"/>
+                              </a:rPr>
+                              <m:t>𝑎</m:t>
+                            </m:r>
+                          </m:e>
+                          <m:sup>
+                            <m:r>
+                              <a:rPr lang="en-US" b="0" i="1" smtClean="0">
+                                <a:latin typeface="Cambria Math" panose="02040503050406030204" pitchFamily="18" charset="0"/>
+                              </a:rPr>
+                              <m:t>′</m:t>
+                            </m:r>
+                          </m:sup>
+                        </m:sSup>
+                      </m:sub>
+                    </m:sSub>
+                  </m:oMath>
+                </a14:m>
+                <a:r>
+                  <a:rPr lang="en-US" dirty="0"/>
+                  <a:t> on success and </a:t>
+                </a:r>
+                <a14:m>
+                  <m:oMath xmlns:m="http://schemas.openxmlformats.org/officeDocument/2006/math">
+                    <m:sSub>
+                      <m:sSubPr>
+                        <m:ctrlPr>
+                          <a:rPr lang="en-US" b="0" i="1" smtClean="0">
+                            <a:latin typeface="Cambria Math" panose="02040503050406030204" pitchFamily="18" charset="0"/>
+                          </a:rPr>
+                        </m:ctrlPr>
+                      </m:sSubPr>
+                      <m:e>
+                        <m:r>
+                          <a:rPr lang="en-US" b="0" i="1" smtClean="0">
+                            <a:latin typeface="Cambria Math" panose="02040503050406030204" pitchFamily="18" charset="0"/>
+                          </a:rPr>
+                          <m:t>𝑓</m:t>
+                        </m:r>
+                      </m:e>
+                      <m:sub>
+                        <m:sSup>
+                          <m:sSupPr>
+                            <m:ctrlPr>
+                              <a:rPr lang="en-US" b="0" i="1" smtClean="0">
+                                <a:latin typeface="Cambria Math" panose="02040503050406030204" pitchFamily="18" charset="0"/>
+                              </a:rPr>
+                            </m:ctrlPr>
+                          </m:sSupPr>
+                          <m:e>
+                            <m:r>
+                              <a:rPr lang="en-US" b="0" i="1" smtClean="0">
+                                <a:latin typeface="Cambria Math" panose="02040503050406030204" pitchFamily="18" charset="0"/>
+                              </a:rPr>
+                              <m:t>𝑎</m:t>
+                            </m:r>
+                          </m:e>
+                          <m:sup>
+                            <m:r>
+                              <a:rPr lang="en-US" b="0" i="1" smtClean="0">
+                                <a:latin typeface="Cambria Math" panose="02040503050406030204" pitchFamily="18" charset="0"/>
+                              </a:rPr>
+                              <m:t>′</m:t>
+                            </m:r>
+                          </m:sup>
+                        </m:sSup>
+                      </m:sub>
+                    </m:sSub>
+                  </m:oMath>
+                </a14:m>
+                <a:r>
+                  <a:rPr lang="en-US" dirty="0"/>
+                  <a:t> on failure</a:t>
+                </a:r>
+              </a:p>
+            </p:txBody>
+          </p:sp>
+        </mc:Choice>
+        <mc:Fallback>
+          <p:sp>
+            <p:nvSpPr>
+              <p:cNvPr id="3" name="Content Placeholder 2">
+                <a:extLst>
+                  <a:ext uri="{FF2B5EF4-FFF2-40B4-BE49-F238E27FC236}">
+                    <a16:creationId xmlns:a16="http://schemas.microsoft.com/office/drawing/2014/main" id="{A4218AC6-0F18-4B2C-9BF3-7D95572A5499}"/>
+                  </a:ext>
+                </a:extLst>
+              </p:cNvPr>
+              <p:cNvSpPr>
+                <a:spLocks noGrp="1" noRot="1" noChangeAspect="1" noMove="1" noResize="1" noEditPoints="1" noAdjustHandles="1" noChangeArrowheads="1" noChangeShapeType="1" noTextEdit="1"/>
+              </p:cNvSpPr>
+              <p:nvPr>
+                <p:ph idx="1"/>
+              </p:nvPr>
+            </p:nvSpPr>
+            <p:spPr>
+              <a:blipFill>
+                <a:blip r:embed="rId2"/>
+                <a:stretch>
+                  <a:fillRect l="-571" t="-1361"/>
+                </a:stretch>
+              </a:blipFill>
+            </p:spPr>
+            <p:txBody>
+              <a:bodyPr/>
+              <a:lstStyle/>
+              <a:p>
+                <a:r>
+                  <a:rPr lang="en-US">
+                    <a:noFill/>
+                  </a:rPr>
+                  <a:t> </a:t>
+                </a:r>
+              </a:p>
+            </p:txBody>
+          </p:sp>
+        </mc:Fallback>
+      </mc:AlternateContent>
+      <p:pic>
+        <p:nvPicPr>
+          <p:cNvPr id="4" name="Picture 3">
             <a:extLst>
               <a:ext uri="{FF2B5EF4-FFF2-40B4-BE49-F238E27FC236}">
-                <a16:creationId xmlns:a16="http://schemas.microsoft.com/office/drawing/2014/main" id="{A4218AC6-0F18-4B2C-9BF3-7D95572A5499}"/>
+                <a16:creationId xmlns:a16="http://schemas.microsoft.com/office/drawing/2014/main" id="{B393A74A-FA55-430C-AFD2-375F8ACCEA90}"/>
               </a:ext>
             </a:extLst>
           </p:cNvPr>
-          <p:cNvSpPr>
-            <a:spLocks noGrp="1"/>
-          </p:cNvSpPr>
-          <p:nvPr>
-            <p:ph idx="1"/>
-          </p:nvPr>
-        </p:nvSpPr>
-        <p:spPr/>
-        <p:txBody>
-          <a:bodyPr/>
-          <a:lstStyle/>
-          <a:p>
-            <a:r>
-              <a:rPr lang="en-US" dirty="0"/>
-              <a:t>[reference 1930’s paper]</a:t>
-            </a:r>
-          </a:p>
-          <a:p>
-            <a:endParaRPr lang="en-US" dirty="0"/>
-          </a:p>
-        </p:txBody>
-      </p:sp>
+          <p:cNvPicPr>
+            <a:picLocks noChangeAspect="1"/>
+          </p:cNvPicPr>
+          <p:nvPr/>
+        </p:nvPicPr>
+        <p:blipFill>
+          <a:blip r:embed="rId3"/>
+          <a:stretch>
+            <a:fillRect/>
+          </a:stretch>
+        </p:blipFill>
+        <p:spPr>
+          <a:xfrm>
+            <a:off x="8934309" y="340789"/>
+            <a:ext cx="2636718" cy="1830912"/>
+          </a:xfrm>
+          <a:prstGeom prst="rect">
+            <a:avLst/>
+          </a:prstGeom>
+        </p:spPr>
+      </p:pic>
+      <p:pic>
+        <p:nvPicPr>
+          <p:cNvPr id="5" name="Picture 4">
+            <a:extLst>
+              <a:ext uri="{FF2B5EF4-FFF2-40B4-BE49-F238E27FC236}">
+                <a16:creationId xmlns:a16="http://schemas.microsoft.com/office/drawing/2014/main" id="{1B1CB0B0-51ED-49F5-8004-097D274BCF1C}"/>
+              </a:ext>
+            </a:extLst>
+          </p:cNvPr>
+          <p:cNvPicPr>
+            <a:picLocks noChangeAspect="1"/>
+          </p:cNvPicPr>
+          <p:nvPr/>
+        </p:nvPicPr>
+        <p:blipFill>
+          <a:blip r:embed="rId4"/>
+          <a:stretch>
+            <a:fillRect/>
+          </a:stretch>
+        </p:blipFill>
+        <p:spPr>
+          <a:xfrm>
+            <a:off x="7981286" y="340788"/>
+            <a:ext cx="3589741" cy="1830912"/>
+          </a:xfrm>
+          <a:prstGeom prst="rect">
+            <a:avLst/>
+          </a:prstGeom>
+        </p:spPr>
+      </p:pic>
     </p:spTree>
     <p:extLst>
       <p:ext uri="{BB962C8B-B14F-4D97-AF65-F5344CB8AC3E}">
@@ -4502,10 +5449,62 @@
           <a:bodyPr/>
           <a:lstStyle/>
           <a:p>
-            <a:endParaRPr lang="en-US"/>
-          </a:p>
-        </p:txBody>
-      </p:sp>
+            <a:pPr marL="0" indent="0">
+              <a:buNone/>
+            </a:pPr>
+            <a:r>
+              <a:rPr lang="en-US" dirty="0"/>
+              <a:t>Open the associated </a:t>
+            </a:r>
+            <a:r>
+              <a:rPr lang="en-US" dirty="0" err="1">
+                <a:hlinkClick r:id="rId2" action="ppaction://hlinkfile"/>
+              </a:rPr>
+              <a:t>IPython</a:t>
+            </a:r>
+            <a:r>
+              <a:rPr lang="en-US" dirty="0">
+                <a:hlinkClick r:id="rId2" action="ppaction://hlinkfile"/>
+              </a:rPr>
+              <a:t> notebook</a:t>
+            </a:r>
+            <a:r>
+              <a:rPr lang="en-US" dirty="0"/>
+              <a:t> for an interactive demonstration of Thompson Sampling</a:t>
+            </a:r>
+          </a:p>
+        </p:txBody>
+      </p:sp>
+      <p:pic>
+        <p:nvPicPr>
+          <p:cNvPr id="6" name="Picture 5">
+            <a:extLst>
+              <a:ext uri="{FF2B5EF4-FFF2-40B4-BE49-F238E27FC236}">
+                <a16:creationId xmlns:a16="http://schemas.microsoft.com/office/drawing/2014/main" id="{235B8D35-DF84-4874-AD81-A993F86115BF}"/>
+              </a:ext>
+            </a:extLst>
+          </p:cNvPr>
+          <p:cNvPicPr>
+            <a:picLocks noChangeAspect="1"/>
+          </p:cNvPicPr>
+          <p:nvPr/>
+        </p:nvPicPr>
+        <p:blipFill>
+          <a:blip r:embed="rId3"/>
+          <a:stretch>
+            <a:fillRect/>
+          </a:stretch>
+        </p:blipFill>
+        <p:spPr>
+          <a:xfrm>
+            <a:off x="4562250" y="3171406"/>
+            <a:ext cx="3219899" cy="3000794"/>
+          </a:xfrm>
+          <a:prstGeom prst="rect">
+            <a:avLst/>
+          </a:prstGeom>
+        </p:spPr>
+      </p:pic>
     </p:spTree>
     <p:extLst>
       <p:ext uri="{BB962C8B-B14F-4D97-AF65-F5344CB8AC3E}">
@@ -4564,37 +5563,254 @@
           </a:p>
         </p:txBody>
       </p:sp>
-      <p:sp>
-        <p:nvSpPr>
-          <p:cNvPr id="3" name="Content Placeholder 2">
+      <mc:AlternateContent xmlns:mc="http://schemas.openxmlformats.org/markup-compatibility/2006">
+        <mc:Choice xmlns:a14="http://schemas.microsoft.com/office/drawing/2010/main" Requires="a14">
+          <p:sp>
+            <p:nvSpPr>
+              <p:cNvPr id="3" name="Content Placeholder 2">
+                <a:extLst>
+                  <a:ext uri="{FF2B5EF4-FFF2-40B4-BE49-F238E27FC236}">
+                    <a16:creationId xmlns:a16="http://schemas.microsoft.com/office/drawing/2014/main" id="{CDB7F3BD-10A3-4B92-9A3D-716CDF32F309}"/>
+                  </a:ext>
+                </a:extLst>
+              </p:cNvPr>
+              <p:cNvSpPr>
+                <a:spLocks noGrp="1"/>
+              </p:cNvSpPr>
+              <p:nvPr>
+                <p:ph idx="1"/>
+              </p:nvPr>
+            </p:nvSpPr>
+            <p:spPr>
+              <a:xfrm>
+                <a:off x="1371600" y="2285999"/>
+                <a:ext cx="9601200" cy="3719015"/>
+              </a:xfrm>
+            </p:spPr>
+            <p:txBody>
+              <a:bodyPr>
+                <a:normAutofit/>
+              </a:bodyPr>
+              <a:lstStyle/>
+              <a:p>
+                <a:r>
+                  <a:rPr lang="en-US" dirty="0"/>
+                  <a:t>Asymptotic estimation to true expected values</a:t>
+                </a:r>
+              </a:p>
+              <a:p>
+                <a:pPr lvl="1"/>
+                <a:r>
+                  <a:rPr lang="en-US" dirty="0"/>
+                  <a:t>Samples each arm infinitely often</a:t>
+                </a:r>
+              </a:p>
+              <a:p>
+                <a:pPr lvl="1"/>
+                <a:r>
+                  <a:rPr lang="en-US" dirty="0"/>
+                  <a:t>Sample mean, unbiased estimator</a:t>
+                </a:r>
+              </a:p>
+              <a:p>
+                <a:r>
+                  <a:rPr lang="en-US" dirty="0"/>
+                  <a:t>Asymptotic convergence to optimal policy</a:t>
+                </a:r>
+              </a:p>
+              <a:p>
+                <a:pPr lvl="1"/>
+                <a:r>
+                  <a:rPr lang="en-US" dirty="0"/>
+                  <a:t>Proportion of non-optimal actions goes to zero</a:t>
+                </a:r>
+              </a:p>
+              <a:p>
+                <a:r>
+                  <a:rPr lang="en-US" dirty="0"/>
+                  <a:t>Achieves logarithmic regret [2]</a:t>
+                </a:r>
+              </a:p>
+              <a:p>
+                <a:pPr lvl="1"/>
+                <a:r>
+                  <a:rPr lang="en-US" dirty="0"/>
+                  <a:t>Non-optimal arms must be pulled </a:t>
+                </a:r>
+                <a14:m>
+                  <m:oMath xmlns:m="http://schemas.openxmlformats.org/officeDocument/2006/math">
+                    <m:r>
+                      <a:rPr lang="en-US" i="1" dirty="0" smtClean="0">
+                        <a:latin typeface="Cambria Math" panose="02040503050406030204" pitchFamily="18" charset="0"/>
+                      </a:rPr>
+                      <m:t>𝑂</m:t>
+                    </m:r>
+                    <m:r>
+                      <a:rPr lang="en-US" i="1" dirty="0" smtClean="0">
+                        <a:latin typeface="Cambria Math" panose="02040503050406030204" pitchFamily="18" charset="0"/>
+                      </a:rPr>
+                      <m:t>(</m:t>
+                    </m:r>
+                    <m:r>
+                      <m:rPr>
+                        <m:sty m:val="p"/>
+                      </m:rPr>
+                      <a:rPr lang="en-US" i="1" dirty="0" smtClean="0">
+                        <a:latin typeface="Cambria Math" panose="02040503050406030204" pitchFamily="18" charset="0"/>
+                      </a:rPr>
+                      <m:t>log</m:t>
+                    </m:r>
+                    <m:r>
+                      <a:rPr lang="en-US" i="1" dirty="0" smtClean="0">
+                        <a:latin typeface="Cambria Math" panose="02040503050406030204" pitchFamily="18" charset="0"/>
+                      </a:rPr>
+                      <m:t>⁡(</m:t>
+                    </m:r>
+                    <m:r>
+                      <a:rPr lang="en-US" i="1" dirty="0" smtClean="0">
+                        <a:latin typeface="Cambria Math" panose="02040503050406030204" pitchFamily="18" charset="0"/>
+                      </a:rPr>
+                      <m:t>𝑟𝑜𝑢𝑛𝑑𝑠</m:t>
+                    </m:r>
+                    <m:r>
+                      <a:rPr lang="en-US" i="1" dirty="0" smtClean="0">
+                        <a:latin typeface="Cambria Math" panose="02040503050406030204" pitchFamily="18" charset="0"/>
+                      </a:rPr>
+                      <m:t>))</m:t>
+                    </m:r>
+                  </m:oMath>
+                </a14:m>
+                <a:r>
+                  <a:rPr lang="en-US" dirty="0"/>
+                  <a:t> times [3]</a:t>
+                </a:r>
+              </a:p>
+              <a:p>
+                <a:pPr lvl="1"/>
+                <a:r>
+                  <a:rPr lang="en-US" dirty="0"/>
+                  <a:t>Intuitively, fastest convergence to optimal policy without foreknowledge</a:t>
+                </a:r>
+              </a:p>
+              <a:p>
+                <a:r>
+                  <a:rPr lang="en-US" dirty="0"/>
+                  <a:t>Note: guarantees not proven for all variants of banditry</a:t>
+                </a:r>
+              </a:p>
+            </p:txBody>
+          </p:sp>
+        </mc:Choice>
+        <mc:Fallback>
+          <p:sp>
+            <p:nvSpPr>
+              <p:cNvPr id="3" name="Content Placeholder 2">
+                <a:extLst>
+                  <a:ext uri="{FF2B5EF4-FFF2-40B4-BE49-F238E27FC236}">
+                    <a16:creationId xmlns:a16="http://schemas.microsoft.com/office/drawing/2014/main" id="{CDB7F3BD-10A3-4B92-9A3D-716CDF32F309}"/>
+                  </a:ext>
+                </a:extLst>
+              </p:cNvPr>
+              <p:cNvSpPr>
+                <a:spLocks noGrp="1" noRot="1" noChangeAspect="1" noMove="1" noResize="1" noEditPoints="1" noAdjustHandles="1" noChangeArrowheads="1" noChangeShapeType="1" noTextEdit="1"/>
+              </p:cNvSpPr>
+              <p:nvPr>
+                <p:ph idx="1"/>
+              </p:nvPr>
+            </p:nvSpPr>
+            <p:spPr>
+              <a:xfrm>
+                <a:off x="1371600" y="2285999"/>
+                <a:ext cx="9601200" cy="3719015"/>
+              </a:xfrm>
+              <a:blipFill>
+                <a:blip r:embed="rId2"/>
+                <a:stretch>
+                  <a:fillRect l="-571" t="-1311"/>
+                </a:stretch>
+              </a:blipFill>
+            </p:spPr>
+            <p:txBody>
+              <a:bodyPr/>
+              <a:lstStyle/>
+              <a:p>
+                <a:r>
+                  <a:rPr lang="en-US">
+                    <a:noFill/>
+                  </a:rPr>
+                  <a:t> </a:t>
+                </a:r>
+              </a:p>
+            </p:txBody>
+          </p:sp>
+        </mc:Fallback>
+      </mc:AlternateContent>
+      <p:pic>
+        <p:nvPicPr>
+          <p:cNvPr id="5" name="Picture 4">
             <a:extLst>
               <a:ext uri="{FF2B5EF4-FFF2-40B4-BE49-F238E27FC236}">
-                <a16:creationId xmlns:a16="http://schemas.microsoft.com/office/drawing/2014/main" id="{CDB7F3BD-10A3-4B92-9A3D-716CDF32F309}"/>
+                <a16:creationId xmlns:a16="http://schemas.microsoft.com/office/drawing/2014/main" id="{4E7D46DE-8B2E-4F61-AAD5-9259E5E8292F}"/>
               </a:ext>
             </a:extLst>
           </p:cNvPr>
-          <p:cNvSpPr>
-            <a:spLocks noGrp="1"/>
-          </p:cNvSpPr>
-          <p:nvPr>
-            <p:ph idx="1"/>
-          </p:nvPr>
-        </p:nvSpPr>
-        <p:spPr/>
-        <p:txBody>
-          <a:bodyPr/>
-          <a:lstStyle/>
-          <a:p>
-            <a:r>
-              <a:rPr lang="en-US" dirty="0"/>
-              <a:t>[reference log(n) regret proof papers, convergence to true expected values and optimal policy]</a:t>
-            </a:r>
-          </a:p>
-          <a:p>
-            <a:endParaRPr lang="en-US" dirty="0"/>
-          </a:p>
-        </p:txBody>
-      </p:sp>
+          <p:cNvPicPr>
+            <a:picLocks noChangeAspect="1"/>
+          </p:cNvPicPr>
+          <p:nvPr/>
+        </p:nvPicPr>
+        <p:blipFill>
+          <a:blip r:embed="rId3"/>
+          <a:stretch>
+            <a:fillRect/>
+          </a:stretch>
+        </p:blipFill>
+        <p:spPr>
+          <a:xfrm>
+            <a:off x="8353053" y="492366"/>
+            <a:ext cx="2619747" cy="1793633"/>
+          </a:xfrm>
+          <a:prstGeom prst="rect">
+            <a:avLst/>
+          </a:prstGeom>
+        </p:spPr>
+      </p:pic>
+      <p:pic>
+        <p:nvPicPr>
+          <p:cNvPr id="7" name="Picture 6">
+            <a:extLst>
+              <a:ext uri="{FF2B5EF4-FFF2-40B4-BE49-F238E27FC236}">
+                <a16:creationId xmlns:a16="http://schemas.microsoft.com/office/drawing/2014/main" id="{99686F37-1995-4133-A9C0-00358C9AD4B9}"/>
+              </a:ext>
+            </a:extLst>
+          </p:cNvPr>
+          <p:cNvPicPr>
+            <a:picLocks noChangeAspect="1"/>
+          </p:cNvPicPr>
+          <p:nvPr/>
+        </p:nvPicPr>
+        <p:blipFill>
+          <a:blip r:embed="rId4">
+            <a:extLst>
+              <a:ext uri="{28A0092B-C50C-407E-A947-70E740481C1C}">
+                <a14:useLocalDpi xmlns:a14="http://schemas.microsoft.com/office/drawing/2010/main" val="0"/>
+              </a:ext>
+            </a:extLst>
+          </a:blip>
+          <a:stretch>
+            <a:fillRect/>
+          </a:stretch>
+        </p:blipFill>
+        <p:spPr>
+          <a:xfrm>
+            <a:off x="7829397" y="397491"/>
+            <a:ext cx="3667058" cy="3548418"/>
+          </a:xfrm>
+          <a:prstGeom prst="rect">
+            <a:avLst/>
+          </a:prstGeom>
+        </p:spPr>
+      </p:pic>
     </p:spTree>
     <p:extLst>
       <p:ext uri="{BB962C8B-B14F-4D97-AF65-F5344CB8AC3E}">
@@ -4669,18 +5885,122 @@
             <p:ph idx="1"/>
           </p:nvPr>
         </p:nvSpPr>
-        <p:spPr/>
-        <p:txBody>
-          <a:bodyPr/>
+        <p:spPr>
+          <a:xfrm>
+            <a:off x="1371600" y="2286000"/>
+            <a:ext cx="9601200" cy="4101152"/>
+          </a:xfrm>
+        </p:spPr>
+        <p:txBody>
+          <a:bodyPr>
+            <a:normAutofit lnSpcReduction="10000"/>
+          </a:bodyPr>
           <a:lstStyle/>
           <a:p>
             <a:r>
               <a:rPr lang="en-US" dirty="0"/>
-              <a:t>[Beta Distribution formulations, choice of priors, Dirichlet for multi-outcome]</a:t>
-            </a:r>
-          </a:p>
-        </p:txBody>
-      </p:sp>
+              <a:t>Keeping Counts</a:t>
+            </a:r>
+          </a:p>
+          <a:p>
+            <a:pPr lvl="1"/>
+            <a:r>
+              <a:rPr lang="en-US" dirty="0"/>
+              <a:t>Number of samples &amp; Mean </a:t>
+            </a:r>
+          </a:p>
+          <a:p>
+            <a:pPr lvl="1"/>
+            <a:r>
+              <a:rPr lang="en-US" dirty="0"/>
+              <a:t>Number of samples &amp; High Outcome</a:t>
+            </a:r>
+          </a:p>
+          <a:p>
+            <a:r>
+              <a:rPr lang="en-US" dirty="0"/>
+              <a:t>Choice of Beta prior parameters</a:t>
+            </a:r>
+          </a:p>
+          <a:p>
+            <a:pPr lvl="1"/>
+            <a:r>
+              <a:rPr lang="en-US" dirty="0"/>
+              <a:t>Bayes (1,1), Uniform Distribution, safe bet</a:t>
+            </a:r>
+          </a:p>
+          <a:p>
+            <a:pPr lvl="1"/>
+            <a:r>
+              <a:rPr lang="en-US" dirty="0"/>
+              <a:t>Haldane (0,0), All probability at edges, first-sample failure kills arm</a:t>
+            </a:r>
+          </a:p>
+          <a:p>
+            <a:pPr lvl="1"/>
+            <a:r>
+              <a:rPr lang="en-US" dirty="0"/>
+              <a:t>Jeffrey (0.5, 0.5), Non-informative, risky for some bandits [4]</a:t>
+            </a:r>
+          </a:p>
+          <a:p>
+            <a:r>
+              <a:rPr lang="en-US" dirty="0"/>
+              <a:t>Choice of Prior Distribution for other Problems</a:t>
+            </a:r>
+          </a:p>
+          <a:p>
+            <a:pPr lvl="1"/>
+            <a:r>
+              <a:rPr lang="en-US" dirty="0"/>
+              <a:t>Dirichlet for multi-outcome bandits</a:t>
+            </a:r>
+          </a:p>
+          <a:p>
+            <a:pPr lvl="1"/>
+            <a:r>
+              <a:rPr lang="en-US" dirty="0"/>
+              <a:t>Gaussian for unbounded Real-Valued bandits</a:t>
+            </a:r>
+          </a:p>
+          <a:p>
+            <a:r>
+              <a:rPr lang="en-US" dirty="0"/>
+              <a:t>Non-stationary and Contextual Bandits, General RL Formulations</a:t>
+            </a:r>
+          </a:p>
+        </p:txBody>
+      </p:sp>
+      <p:pic>
+        <p:nvPicPr>
+          <p:cNvPr id="6" name="Picture 5">
+            <a:extLst>
+              <a:ext uri="{FF2B5EF4-FFF2-40B4-BE49-F238E27FC236}">
+                <a16:creationId xmlns:a16="http://schemas.microsoft.com/office/drawing/2014/main" id="{4FCCB95F-DB3E-4AD4-8B03-F5D53DF153E4}"/>
+              </a:ext>
+            </a:extLst>
+          </p:cNvPr>
+          <p:cNvPicPr>
+            <a:picLocks noChangeAspect="1"/>
+          </p:cNvPicPr>
+          <p:nvPr/>
+        </p:nvPicPr>
+        <p:blipFill>
+          <a:blip r:embed="rId2"/>
+          <a:stretch>
+            <a:fillRect/>
+          </a:stretch>
+        </p:blipFill>
+        <p:spPr>
+          <a:xfrm>
+            <a:off x="7078727" y="287292"/>
+            <a:ext cx="4858428" cy="3362794"/>
+          </a:xfrm>
+          <a:prstGeom prst="rect">
+            <a:avLst/>
+          </a:prstGeom>
+        </p:spPr>
+      </p:pic>
     </p:spTree>
     <p:extLst>
       <p:ext uri="{BB962C8B-B14F-4D97-AF65-F5344CB8AC3E}">

</xml_diff>